<commit_message>
Adding old poster and its pdf
</commit_message>
<xml_diff>
--- a/Posters/JacobSWOSUFall2018.pptx
+++ b/Posters/JacobSWOSUFall2018.pptx
@@ -203,7 +203,7 @@
           <a:p>
             <a:fld id="{F1C0B079-A316-4C9B-B165-DF9EA8325D2C}" type="datetimeFigureOut">
               <a:rPr lang="en-US" smtClean="0"/>
-              <a:t>11/7/2018</a:t>
+              <a:t>11/9/2018</a:t>
             </a:fld>
             <a:endParaRPr lang="en-US"/>
           </a:p>
@@ -368,7 +368,7 @@
           <a:p>
             <a:fld id="{38F28AB8-57D1-494F-9851-055AD867E790}" type="datetimeFigureOut">
               <a:rPr lang="en-US" smtClean="0"/>
-              <a:t>11/7/2018</a:t>
+              <a:t>11/9/2018</a:t>
             </a:fld>
             <a:endParaRPr lang="en-US"/>
           </a:p>
@@ -4000,7 +4000,7 @@
           <a:p>
             <a:fld id="{ECAA57DF-1C19-4726-AB84-014692BAD8F5}" type="datetimeFigureOut">
               <a:rPr lang="en-US" smtClean="0"/>
-              <a:t>11/7/2018</a:t>
+              <a:t>11/9/2018</a:t>
             </a:fld>
             <a:endParaRPr lang="en-US"/>
           </a:p>
@@ -4339,7 +4339,7 @@
             <a:fld id="{ECAA57DF-1C19-4726-AB84-014692BAD8F5}" type="datetimeFigureOut">
               <a:rPr lang="en-US" smtClean="0"/>
               <a:pPr/>
-              <a:t>11/7/2018</a:t>
+              <a:t>11/9/2018</a:t>
             </a:fld>
             <a:endParaRPr lang="en-US"/>
           </a:p>
@@ -5008,8 +5008,8 @@
         </p:nvSpPr>
         <p:spPr>
           <a:xfrm>
-            <a:off x="1139314" y="7164693"/>
-            <a:ext cx="12468309" cy="18589013"/>
+            <a:off x="972670" y="7164693"/>
+            <a:ext cx="12801600" cy="18589013"/>
           </a:xfrm>
         </p:spPr>
         <p:txBody>
@@ -5112,34 +5112,7 @@
           <a:p>
             <a:r>
               <a:rPr lang="en-US" dirty="0"/>
-              <a:t>Data </a:t>
-            </a:r>
-          </a:p>
-        </p:txBody>
-      </p:sp>
-      <p:sp>
-        <p:nvSpPr>
-          <p:cNvPr id="71" name="Text Placeholder 70"/>
-          <p:cNvSpPr>
-            <a:spLocks noGrp="1"/>
-          </p:cNvSpPr>
-          <p:nvPr>
-            <p:ph type="body" sz="quarter" idx="41"/>
-          </p:nvPr>
-        </p:nvSpPr>
-        <p:spPr>
-          <a:xfrm>
-            <a:off x="29946600" y="15656174"/>
-            <a:ext cx="12801600" cy="1219200"/>
-          </a:xfrm>
-        </p:spPr>
-        <p:txBody>
-          <a:bodyPr/>
-          <a:lstStyle/>
-          <a:p>
-            <a:r>
-              <a:rPr lang="en-US" dirty="0"/>
-              <a:t>Future</a:t>
+              <a:t>Example</a:t>
             </a:r>
           </a:p>
         </p:txBody>
@@ -5156,8 +5129,8 @@
         </p:nvSpPr>
         <p:spPr>
           <a:xfrm>
-            <a:off x="29946600" y="25117665"/>
-            <a:ext cx="12801600" cy="5849301"/>
+            <a:off x="30264652" y="19367177"/>
+            <a:ext cx="12801600" cy="11434221"/>
           </a:xfrm>
         </p:spPr>
         <p:txBody>
@@ -5174,32 +5147,69 @@
               <a:t>Bhatia, R. (2018, April 10). Deeplearning.jpg [Digital image]. Retrieved November 7, 2018, from https://www.analyticsindiamag.com/how-to-build-a-career-in-computer-vision/</a:t>
             </a:r>
           </a:p>
-        </p:txBody>
-      </p:sp>
-      <p:sp>
-        <p:nvSpPr>
-          <p:cNvPr id="21" name="Text Placeholder 20"/>
-          <p:cNvSpPr>
-            <a:spLocks noGrp="1"/>
-          </p:cNvSpPr>
-          <p:nvPr>
-            <p:ph type="body" sz="quarter" idx="34"/>
-          </p:nvPr>
-        </p:nvSpPr>
-        <p:spPr>
-          <a:xfrm>
-            <a:off x="29929817" y="23609129"/>
-            <a:ext cx="12801600" cy="891342"/>
-          </a:xfrm>
-        </p:spPr>
-        <p:txBody>
-          <a:bodyPr/>
-          <a:lstStyle/>
-          <a:p>
-            <a:r>
-              <a:rPr lang="en-US" dirty="0"/>
-              <a:t>Works Cited</a:t>
-            </a:r>
+          <a:p>
+            <a:pPr marL="0" indent="0">
+              <a:buNone/>
+            </a:pPr>
+            <a:r>
+              <a:rPr lang="en-US" sz="4000" dirty="0"/>
+              <a:t>Christophe </a:t>
+            </a:r>
+            <a:r>
+              <a:rPr lang="en-US" sz="4000" dirty="0" err="1"/>
+              <a:t>Andrieu</a:t>
+            </a:r>
+            <a:r>
+              <a:rPr lang="en-US" sz="4000" dirty="0"/>
+              <a:t>, N. D. (2003). An Introduction to MCMC for Machine Learning. Machine Learning, 50, 5-43.</a:t>
+            </a:r>
+          </a:p>
+          <a:p>
+            <a:pPr marL="0" indent="0">
+              <a:buNone/>
+            </a:pPr>
+            <a:r>
+              <a:rPr lang="en-US" sz="4000" dirty="0"/>
+              <a:t>David Martin, C. F. (2001). A Database of Human Segmented Natural Images and its Application to Evaluating Segmentation Algorithms and Measuring Ecological Statistics. Vancouver: IEEE.</a:t>
+            </a:r>
+          </a:p>
+          <a:p>
+            <a:pPr marL="0" indent="0">
+              <a:buNone/>
+            </a:pPr>
+            <a:r>
+              <a:rPr lang="en-US" sz="4000" dirty="0"/>
+              <a:t>Larry </a:t>
+            </a:r>
+            <a:r>
+              <a:rPr lang="en-US" sz="4000" dirty="0" err="1"/>
+              <a:t>Matthies</a:t>
+            </a:r>
+            <a:r>
+              <a:rPr lang="en-US" sz="4000" dirty="0"/>
+              <a:t>, M. M. (2007). Computer Vision on Mars. International Journal of Computer Vision, Volume 75, Issue 1, 67-92.</a:t>
+            </a:r>
+          </a:p>
+          <a:p>
+            <a:pPr marL="0" indent="0">
+              <a:buNone/>
+            </a:pPr>
+            <a:r>
+              <a:rPr lang="en-US" sz="4000" dirty="0"/>
+              <a:t>P.C.H. Martens, e. a. (2012). Computer Vision for the Solar Dynamics Observatory (SDO). Solar Physics, Volume 275, Issue 1-2, 79-113.</a:t>
+            </a:r>
+          </a:p>
+          <a:p>
+            <a:pPr marL="0" indent="0">
+              <a:buNone/>
+            </a:pPr>
+            <a:endParaRPr lang="en-US" sz="4000" dirty="0"/>
+          </a:p>
+          <a:p>
+            <a:pPr marL="0" indent="0">
+              <a:buNone/>
+            </a:pPr>
+            <a:endParaRPr lang="en-US" sz="4000" dirty="0"/>
           </a:p>
         </p:txBody>
       </p:sp>
@@ -5233,8 +5243,8 @@
         </p:blipFill>
         <p:spPr>
           <a:xfrm>
-            <a:off x="30450224" y="7027487"/>
-            <a:ext cx="11760786" cy="6619774"/>
+            <a:off x="30264652" y="7329170"/>
+            <a:ext cx="12801600" cy="6619774"/>
           </a:xfrm>
         </p:spPr>
       </p:pic>
@@ -5280,7 +5290,7 @@
         </p:nvSpPr>
         <p:spPr>
           <a:xfrm>
-            <a:off x="972669" y="25905367"/>
+            <a:off x="972669" y="25894502"/>
             <a:ext cx="12801600" cy="1219200"/>
           </a:xfrm>
         </p:spPr>
@@ -5328,7 +5338,21 @@
                 <a:latin typeface="Times New Roman" panose="02020603050405020304" pitchFamily="18" charset="0"/>
                 <a:cs typeface="Times New Roman" panose="02020603050405020304" pitchFamily="18" charset="0"/>
               </a:rPr>
-              <a:t>This material is based upon work supported by the National Aeronautics and Space Administration under Grant No. NNX15AK02H issued through NASA Education.</a:t>
+              <a:t>This material is based upon work supported by the National Aeronautics and Space Administration under Grant </a:t>
+            </a:r>
+            <a:r>
+              <a:rPr lang="en-US" sz="3600" i="1">
+                <a:latin typeface="Times New Roman" panose="02020603050405020304" pitchFamily="18" charset="0"/>
+                <a:cs typeface="Times New Roman" panose="02020603050405020304" pitchFamily="18" charset="0"/>
+              </a:rPr>
+              <a:t>No.XXXXXX </a:t>
+            </a:r>
+            <a:r>
+              <a:rPr lang="en-US" sz="3600" i="1" dirty="0">
+                <a:latin typeface="Times New Roman" panose="02020603050405020304" pitchFamily="18" charset="0"/>
+                <a:cs typeface="Times New Roman" panose="02020603050405020304" pitchFamily="18" charset="0"/>
+              </a:rPr>
+              <a:t>issued through NASA Education.</a:t>
             </a:r>
           </a:p>
         </p:txBody>
@@ -5347,8 +5371,8 @@
         </p:nvSpPr>
         <p:spPr>
           <a:xfrm>
-            <a:off x="30079081" y="13632214"/>
-            <a:ext cx="12669119" cy="1985159"/>
+            <a:off x="30264652" y="14474040"/>
+            <a:ext cx="12801600" cy="1985159"/>
           </a:xfrm>
           <a:prstGeom prst="rect">
             <a:avLst/>
@@ -5381,7 +5405,7 @@
         </p:nvSpPr>
         <p:spPr>
           <a:xfrm>
-            <a:off x="15459634" y="5579936"/>
+            <a:off x="15615144" y="5579936"/>
             <a:ext cx="12801600" cy="1219200"/>
           </a:xfrm>
         </p:spPr>
@@ -5410,8 +5434,8 @@
         </p:nvSpPr>
         <p:spPr>
           <a:xfrm>
-            <a:off x="15459633" y="7138237"/>
-            <a:ext cx="12801599" cy="10556736"/>
+            <a:off x="15615144" y="7098327"/>
+            <a:ext cx="12801600" cy="10556736"/>
           </a:xfrm>
           <a:prstGeom prst="rect">
             <a:avLst/>
@@ -5557,7 +5581,7 @@
         </p:nvSpPr>
         <p:spPr>
           <a:xfrm>
-            <a:off x="15281098" y="17699904"/>
+            <a:off x="15615144" y="17939900"/>
             <a:ext cx="12980133" cy="1219200"/>
           </a:xfrm>
           <a:prstGeom prst="rect">
@@ -5824,7 +5848,7 @@
         </p:nvSpPr>
         <p:spPr>
           <a:xfrm>
-            <a:off x="15459633" y="25184210"/>
+            <a:off x="15615143" y="24474688"/>
             <a:ext cx="12801600" cy="1219200"/>
           </a:xfrm>
           <a:prstGeom prst="rect">
@@ -6071,6 +6095,158 @@
             <a:r>
               <a:rPr lang="en-US" dirty="0"/>
               <a:t>Other Considerations</a:t>
+            </a:r>
+          </a:p>
+        </p:txBody>
+      </p:sp>
+      <p:sp>
+        <p:nvSpPr>
+          <p:cNvPr id="3" name="TextBox 2">
+            <a:extLst>
+              <a:ext uri="{FF2B5EF4-FFF2-40B4-BE49-F238E27FC236}">
+                <a16:creationId xmlns:a16="http://schemas.microsoft.com/office/drawing/2014/main" id="{BA2362B4-69B1-4DF1-AC2D-049E843F08EC}"/>
+              </a:ext>
+            </a:extLst>
+          </p:cNvPr>
+          <p:cNvSpPr txBox="1"/>
+          <p:nvPr/>
+        </p:nvSpPr>
+        <p:spPr>
+          <a:xfrm>
+            <a:off x="15615143" y="19492930"/>
+            <a:ext cx="12980133" cy="5170646"/>
+          </a:xfrm>
+          <a:prstGeom prst="rect">
+            <a:avLst/>
+          </a:prstGeom>
+          <a:noFill/>
+        </p:spPr>
+        <p:txBody>
+          <a:bodyPr wrap="square" rtlCol="0">
+            <a:spAutoFit/>
+          </a:bodyPr>
+          <a:lstStyle/>
+          <a:p>
+            <a:pPr defTabSz="4389120">
+              <a:spcBef>
+                <a:spcPts val="1200"/>
+              </a:spcBef>
+              <a:buClr>
+                <a:schemeClr val="bg1">
+                  <a:lumMod val="65000"/>
+                </a:schemeClr>
+              </a:buClr>
+            </a:pPr>
+            <a:r>
+              <a:rPr lang="en-US" sz="4000" dirty="0"/>
+              <a:t>One of the goals of this project is for the team to familiarize themselves with machine learning concepts and tools. This benefit is two-fold, in that it prepares the researcher to continue to research more specific and advanced topics as well as allows new students interested in the topic a resource they would have easy access to. </a:t>
+            </a:r>
+          </a:p>
+          <a:p>
+            <a:pPr defTabSz="4389120">
+              <a:spcBef>
+                <a:spcPts val="1200"/>
+              </a:spcBef>
+              <a:buClr>
+                <a:schemeClr val="bg1">
+                  <a:lumMod val="65000"/>
+                </a:schemeClr>
+              </a:buClr>
+            </a:pPr>
+            <a:endParaRPr lang="en-US" sz="4000" dirty="0"/>
+          </a:p>
+        </p:txBody>
+      </p:sp>
+      <p:sp>
+        <p:nvSpPr>
+          <p:cNvPr id="13" name="TextBox 12">
+            <a:extLst>
+              <a:ext uri="{FF2B5EF4-FFF2-40B4-BE49-F238E27FC236}">
+                <a16:creationId xmlns:a16="http://schemas.microsoft.com/office/drawing/2014/main" id="{A3EA552C-4D7E-4795-843C-80917C40F34B}"/>
+              </a:ext>
+            </a:extLst>
+          </p:cNvPr>
+          <p:cNvSpPr txBox="1"/>
+          <p:nvPr/>
+        </p:nvSpPr>
+        <p:spPr>
+          <a:xfrm>
+            <a:off x="15615143" y="26236682"/>
+            <a:ext cx="12801600" cy="4555093"/>
+          </a:xfrm>
+          <a:prstGeom prst="rect">
+            <a:avLst/>
+          </a:prstGeom>
+          <a:noFill/>
+        </p:spPr>
+        <p:txBody>
+          <a:bodyPr wrap="square" rtlCol="0">
+            <a:spAutoFit/>
+          </a:bodyPr>
+          <a:lstStyle/>
+          <a:p>
+            <a:pPr defTabSz="4389120">
+              <a:spcBef>
+                <a:spcPts val="1200"/>
+              </a:spcBef>
+              <a:buClr>
+                <a:schemeClr val="bg1">
+                  <a:lumMod val="65000"/>
+                </a:schemeClr>
+              </a:buClr>
+            </a:pPr>
+            <a:r>
+              <a:rPr lang="en-US" sz="4000" dirty="0"/>
+              <a:t>This project’s primary goal was not to discover the best algorithm, or to develop a more accurate or efficient one. That could certainly be approached with the results of this study, however. </a:t>
+            </a:r>
+          </a:p>
+          <a:p>
+            <a:pPr defTabSz="4389120">
+              <a:spcBef>
+                <a:spcPts val="1200"/>
+              </a:spcBef>
+              <a:buClr>
+                <a:schemeClr val="bg1">
+                  <a:lumMod val="65000"/>
+                </a:schemeClr>
+              </a:buClr>
+            </a:pPr>
+            <a:r>
+              <a:rPr lang="en-US" sz="4000" dirty="0"/>
+              <a:t>It is certainly possible that these algorithms have strengths and weaknesses outside the scope of this study. It was only checked that the they were accurate. </a:t>
+            </a:r>
+          </a:p>
+        </p:txBody>
+      </p:sp>
+      <p:sp>
+        <p:nvSpPr>
+          <p:cNvPr id="20" name="Text Placeholder 19">
+            <a:extLst>
+              <a:ext uri="{FF2B5EF4-FFF2-40B4-BE49-F238E27FC236}">
+                <a16:creationId xmlns:a16="http://schemas.microsoft.com/office/drawing/2014/main" id="{8EB5EA28-636C-47CD-8B35-23FC73C1197F}"/>
+              </a:ext>
+            </a:extLst>
+          </p:cNvPr>
+          <p:cNvSpPr>
+            <a:spLocks noGrp="1"/>
+          </p:cNvSpPr>
+          <p:nvPr>
+            <p:ph type="body" sz="quarter" idx="41"/>
+          </p:nvPr>
+        </p:nvSpPr>
+        <p:spPr>
+          <a:xfrm>
+            <a:off x="30264652" y="17255135"/>
+            <a:ext cx="12801600" cy="1219200"/>
+          </a:xfrm>
+        </p:spPr>
+        <p:txBody>
+          <a:bodyPr/>
+          <a:lstStyle/>
+          <a:p>
+            <a:r>
+              <a:rPr lang="en-US" dirty="0"/>
+              <a:t>References</a:t>
             </a:r>
           </a:p>
         </p:txBody>

</xml_diff>